<commit_message>
Update Model class diagrams
</commit_message>
<xml_diff>
--- a/docs/diagrams/ModelComponentClassBetterOopDiagram.pptx
+++ b/docs/diagrams/ModelComponentClassBetterOopDiagram.pptx
@@ -208,7 +208,7 @@
           <a:p>
             <a:fld id="{F5CC4B3F-88C1-4FFA-B1B6-F41C21DC6924}" type="datetimeFigureOut">
               <a:rPr lang="en-US" smtClean="0"/>
-              <a:t>12/5/2018</a:t>
+              <a:t>3/4/2019</a:t>
             </a:fld>
             <a:endParaRPr lang="en-US"/>
           </a:p>
@@ -654,7 +654,7 @@
           <a:p>
             <a:fld id="{78C97017-6FC3-485B-9764-EAC9E56C1D49}" type="datetimeFigureOut">
               <a:rPr lang="en-US" smtClean="0"/>
-              <a:t>12/5/2018</a:t>
+              <a:t>3/4/2019</a:t>
             </a:fld>
             <a:endParaRPr lang="en-US"/>
           </a:p>
@@ -822,7 +822,7 @@
           <a:p>
             <a:fld id="{78C97017-6FC3-485B-9764-EAC9E56C1D49}" type="datetimeFigureOut">
               <a:rPr lang="en-US" smtClean="0"/>
-              <a:t>12/5/2018</a:t>
+              <a:t>3/4/2019</a:t>
             </a:fld>
             <a:endParaRPr lang="en-US"/>
           </a:p>
@@ -1000,7 +1000,7 @@
           <a:p>
             <a:fld id="{78C97017-6FC3-485B-9764-EAC9E56C1D49}" type="datetimeFigureOut">
               <a:rPr lang="en-US" smtClean="0"/>
-              <a:t>12/5/2018</a:t>
+              <a:t>3/4/2019</a:t>
             </a:fld>
             <a:endParaRPr lang="en-US"/>
           </a:p>
@@ -1168,7 +1168,7 @@
           <a:p>
             <a:fld id="{78C97017-6FC3-485B-9764-EAC9E56C1D49}" type="datetimeFigureOut">
               <a:rPr lang="en-US" smtClean="0"/>
-              <a:t>12/5/2018</a:t>
+              <a:t>3/4/2019</a:t>
             </a:fld>
             <a:endParaRPr lang="en-US"/>
           </a:p>
@@ -1413,7 +1413,7 @@
           <a:p>
             <a:fld id="{78C97017-6FC3-485B-9764-EAC9E56C1D49}" type="datetimeFigureOut">
               <a:rPr lang="en-US" smtClean="0"/>
-              <a:t>12/5/2018</a:t>
+              <a:t>3/4/2019</a:t>
             </a:fld>
             <a:endParaRPr lang="en-US"/>
           </a:p>
@@ -1698,7 +1698,7 @@
           <a:p>
             <a:fld id="{78C97017-6FC3-485B-9764-EAC9E56C1D49}" type="datetimeFigureOut">
               <a:rPr lang="en-US" smtClean="0"/>
-              <a:t>12/5/2018</a:t>
+              <a:t>3/4/2019</a:t>
             </a:fld>
             <a:endParaRPr lang="en-US"/>
           </a:p>
@@ -2117,7 +2117,7 @@
           <a:p>
             <a:fld id="{78C97017-6FC3-485B-9764-EAC9E56C1D49}" type="datetimeFigureOut">
               <a:rPr lang="en-US" smtClean="0"/>
-              <a:t>12/5/2018</a:t>
+              <a:t>3/4/2019</a:t>
             </a:fld>
             <a:endParaRPr lang="en-US"/>
           </a:p>
@@ -2234,7 +2234,7 @@
           <a:p>
             <a:fld id="{78C97017-6FC3-485B-9764-EAC9E56C1D49}" type="datetimeFigureOut">
               <a:rPr lang="en-US" smtClean="0"/>
-              <a:t>12/5/2018</a:t>
+              <a:t>3/4/2019</a:t>
             </a:fld>
             <a:endParaRPr lang="en-US"/>
           </a:p>
@@ -2329,7 +2329,7 @@
           <a:p>
             <a:fld id="{78C97017-6FC3-485B-9764-EAC9E56C1D49}" type="datetimeFigureOut">
               <a:rPr lang="en-US" smtClean="0"/>
-              <a:t>12/5/2018</a:t>
+              <a:t>3/4/2019</a:t>
             </a:fld>
             <a:endParaRPr lang="en-US"/>
           </a:p>
@@ -2604,7 +2604,7 @@
           <a:p>
             <a:fld id="{78C97017-6FC3-485B-9764-EAC9E56C1D49}" type="datetimeFigureOut">
               <a:rPr lang="en-US" smtClean="0"/>
-              <a:t>12/5/2018</a:t>
+              <a:t>3/4/2019</a:t>
             </a:fld>
             <a:endParaRPr lang="en-US"/>
           </a:p>
@@ -2856,7 +2856,7 @@
           <a:p>
             <a:fld id="{78C97017-6FC3-485B-9764-EAC9E56C1D49}" type="datetimeFigureOut">
               <a:rPr lang="en-US" smtClean="0"/>
-              <a:t>12/5/2018</a:t>
+              <a:t>3/4/2019</a:t>
             </a:fld>
             <a:endParaRPr lang="en-US"/>
           </a:p>
@@ -3067,7 +3067,7 @@
           <a:p>
             <a:fld id="{78C97017-6FC3-485B-9764-EAC9E56C1D49}" type="datetimeFigureOut">
               <a:rPr lang="en-US" smtClean="0"/>
-              <a:t>12/5/2018</a:t>
+              <a:t>3/4/2019</a:t>
             </a:fld>
             <a:endParaRPr lang="en-US"/>
           </a:p>
@@ -3450,8 +3450,8 @@
         </p:nvSpPr>
         <p:spPr>
           <a:xfrm>
-            <a:off x="1754912" y="3324621"/>
-            <a:ext cx="1447688" cy="346760"/>
+            <a:off x="1445600" y="2604085"/>
+            <a:ext cx="1602400" cy="346760"/>
           </a:xfrm>
           <a:prstGeom prst="rect">
             <a:avLst/>
@@ -3488,7 +3488,7 @@
                   <a:srgbClr val="7030A0"/>
                 </a:solidFill>
               </a:rPr>
-              <a:t>VersionedAddressBook</a:t>
+              <a:t>VersionedFinanceTracker</a:t>
             </a:r>
             <a:endParaRPr lang="en-SG" sz="1050" dirty="0">
               <a:solidFill>
@@ -3506,8 +3506,8 @@
         </p:nvSpPr>
         <p:spPr>
           <a:xfrm>
-            <a:off x="3730715" y="3353144"/>
-            <a:ext cx="1156969" cy="346760"/>
+            <a:off x="3731405" y="2472978"/>
+            <a:ext cx="1156969" cy="285784"/>
           </a:xfrm>
           <a:prstGeom prst="rect">
             <a:avLst/>
@@ -3544,7 +3544,7 @@
                   <a:srgbClr val="7030A0"/>
                 </a:solidFill>
               </a:rPr>
-              <a:t>UniquePersonList</a:t>
+              <a:t>RecurringList</a:t>
             </a:r>
             <a:endParaRPr lang="en-SG" sz="1050" dirty="0">
               <a:solidFill>
@@ -3562,7 +3562,7 @@
         </p:nvSpPr>
         <p:spPr>
           <a:xfrm>
-            <a:off x="3201752" y="3437911"/>
+            <a:off x="3050255" y="2717375"/>
             <a:ext cx="236048" cy="173380"/>
           </a:xfrm>
           <a:prstGeom prst="flowChartDecision">
@@ -3605,18 +3605,21 @@
         <p:nvCxnSpPr>
           <p:cNvPr id="30" name="Elbow Connector 29"/>
           <p:cNvCxnSpPr>
+            <a:cxnSpLocks/>
             <a:stCxn id="51" idx="3"/>
             <a:endCxn id="49" idx="1"/>
           </p:cNvCxnSpPr>
           <p:nvPr/>
         </p:nvCxnSpPr>
         <p:spPr>
-          <a:xfrm>
-            <a:off x="3437800" y="3524601"/>
-            <a:ext cx="292915" cy="1923"/>
+          <a:xfrm flipV="1">
+            <a:off x="3286303" y="2615870"/>
+            <a:ext cx="445102" cy="188195"/>
           </a:xfrm>
           <a:prstGeom prst="bentConnector3">
-            <a:avLst/>
+            <a:avLst>
+              <a:gd name="adj1" fmla="val 50000"/>
+            </a:avLst>
           </a:prstGeom>
           <a:ln w="19050">
             <a:solidFill>
@@ -3650,8 +3653,8 @@
         </p:nvSpPr>
         <p:spPr>
           <a:xfrm>
-            <a:off x="5282183" y="3347776"/>
-            <a:ext cx="708186" cy="346760"/>
+            <a:off x="5334000" y="2477326"/>
+            <a:ext cx="708186" cy="285079"/>
           </a:xfrm>
           <a:prstGeom prst="rect">
             <a:avLst/>
@@ -3688,7 +3691,7 @@
                   <a:srgbClr val="7030A0"/>
                 </a:solidFill>
               </a:rPr>
-              <a:t>Person</a:t>
+              <a:t>Recurring</a:t>
             </a:r>
             <a:endParaRPr lang="en-SG" sz="1050" dirty="0">
               <a:solidFill>
@@ -3706,13 +3709,15 @@
         </p:nvSpPr>
         <p:spPr>
           <a:xfrm>
-            <a:off x="4886966" y="3430775"/>
+            <a:off x="4880450" y="2536587"/>
             <a:ext cx="236048" cy="173380"/>
           </a:xfrm>
           <a:prstGeom prst="flowChartDecision">
             <a:avLst/>
           </a:prstGeom>
-          <a:noFill/>
+          <a:solidFill>
+            <a:srgbClr val="7030A0"/>
+          </a:solidFill>
           <a:ln w="19050">
             <a:solidFill>
               <a:srgbClr val="7030A0"/>
@@ -3754,9 +3759,9 @@
           <p:nvPr/>
         </p:nvCxnSpPr>
         <p:spPr>
-          <a:xfrm>
-            <a:off x="5123014" y="3517465"/>
-            <a:ext cx="159169" cy="3691"/>
+          <a:xfrm flipV="1">
+            <a:off x="5116498" y="2619866"/>
+            <a:ext cx="217502" cy="3411"/>
           </a:xfrm>
           <a:prstGeom prst="bentConnector3">
             <a:avLst/>
@@ -3793,7 +3798,7 @@
         </p:nvSpPr>
         <p:spPr>
           <a:xfrm>
-            <a:off x="6680903" y="3053948"/>
+            <a:off x="6844032" y="2133600"/>
             <a:ext cx="708186" cy="285783"/>
           </a:xfrm>
           <a:prstGeom prst="rect">
@@ -3849,7 +3854,7 @@
         </p:nvSpPr>
         <p:spPr>
           <a:xfrm>
-            <a:off x="6010453" y="3437911"/>
+            <a:off x="6036804" y="2030977"/>
             <a:ext cx="236048" cy="173380"/>
           </a:xfrm>
           <a:prstGeom prst="flowChartDecision">
@@ -3893,13 +3898,15 @@
           <p:cNvPr id="79" name="Elbow Connector 78"/>
           <p:cNvCxnSpPr>
             <a:cxnSpLocks/>
+            <a:stCxn id="78" idx="3"/>
+            <a:endCxn id="76" idx="1"/>
           </p:cNvCxnSpPr>
           <p:nvPr/>
         </p:nvCxnSpPr>
         <p:spPr>
-          <a:xfrm flipV="1">
-            <a:off x="6246501" y="3196531"/>
-            <a:ext cx="434402" cy="327761"/>
+          <a:xfrm>
+            <a:off x="6272852" y="2117667"/>
+            <a:ext cx="571180" cy="158825"/>
           </a:xfrm>
           <a:prstGeom prst="bentConnector3">
             <a:avLst/>
@@ -3936,7 +3943,7 @@
         </p:nvSpPr>
         <p:spPr>
           <a:xfrm>
-            <a:off x="6680903" y="3376926"/>
+            <a:off x="6844032" y="2456578"/>
             <a:ext cx="708186" cy="285783"/>
           </a:xfrm>
           <a:prstGeom prst="rect">
@@ -3974,7 +3981,7 @@
                   <a:srgbClr val="7030A0"/>
                 </a:solidFill>
               </a:rPr>
-              <a:t>Phone</a:t>
+              <a:t>Amount</a:t>
             </a:r>
             <a:endParaRPr lang="en-SG" sz="1050" dirty="0">
               <a:solidFill>
@@ -3984,19 +3991,132 @@
           </a:p>
         </p:txBody>
       </p:sp>
+      <p:sp>
+        <p:nvSpPr>
+          <p:cNvPr id="83" name="Rectangle 8"/>
+          <p:cNvSpPr/>
+          <p:nvPr/>
+        </p:nvSpPr>
+        <p:spPr>
+          <a:xfrm>
+            <a:off x="6844032" y="2779556"/>
+            <a:ext cx="708186" cy="285783"/>
+          </a:xfrm>
+          <a:prstGeom prst="rect">
+            <a:avLst/>
+          </a:prstGeom>
+          <a:ln w="19050">
+            <a:solidFill>
+              <a:srgbClr val="7030A0"/>
+            </a:solidFill>
+          </a:ln>
+          <a:effectLst/>
+        </p:spPr>
+        <p:style>
+          <a:lnRef idx="1">
+            <a:schemeClr val="accent4"/>
+          </a:lnRef>
+          <a:fillRef idx="2">
+            <a:schemeClr val="accent4"/>
+          </a:fillRef>
+          <a:effectRef idx="1">
+            <a:schemeClr val="accent4"/>
+          </a:effectRef>
+          <a:fontRef idx="minor">
+            <a:schemeClr val="dk1"/>
+          </a:fontRef>
+        </p:style>
+        <p:txBody>
+          <a:bodyPr rtlCol="0" anchor="ctr"/>
+          <a:lstStyle/>
+          <a:p>
+            <a:pPr algn="ctr"/>
+            <a:r>
+              <a:rPr lang="en-US" sz="1050" dirty="0">
+                <a:solidFill>
+                  <a:srgbClr val="7030A0"/>
+                </a:solidFill>
+              </a:rPr>
+              <a:t>Date</a:t>
+            </a:r>
+            <a:endParaRPr lang="en-SG" sz="1050" dirty="0">
+              <a:solidFill>
+                <a:srgbClr val="7030A0"/>
+              </a:solidFill>
+            </a:endParaRPr>
+          </a:p>
+        </p:txBody>
+      </p:sp>
+      <p:sp>
+        <p:nvSpPr>
+          <p:cNvPr id="85" name="Rectangle 8"/>
+          <p:cNvSpPr/>
+          <p:nvPr/>
+        </p:nvSpPr>
+        <p:spPr>
+          <a:xfrm>
+            <a:off x="6844031" y="3102533"/>
+            <a:ext cx="1156969" cy="467961"/>
+          </a:xfrm>
+          <a:prstGeom prst="rect">
+            <a:avLst/>
+          </a:prstGeom>
+          <a:ln w="19050">
+            <a:solidFill>
+              <a:srgbClr val="7030A0"/>
+            </a:solidFill>
+          </a:ln>
+          <a:effectLst/>
+        </p:spPr>
+        <p:style>
+          <a:lnRef idx="1">
+            <a:schemeClr val="accent4"/>
+          </a:lnRef>
+          <a:fillRef idx="2">
+            <a:schemeClr val="accent4"/>
+          </a:fillRef>
+          <a:effectRef idx="1">
+            <a:schemeClr val="accent4"/>
+          </a:effectRef>
+          <a:fontRef idx="minor">
+            <a:schemeClr val="dk1"/>
+          </a:fontRef>
+        </p:style>
+        <p:txBody>
+          <a:bodyPr rtlCol="0" anchor="ctr"/>
+          <a:lstStyle/>
+          <a:p>
+            <a:pPr algn="ctr"/>
+            <a:r>
+              <a:rPr lang="en-US" sz="1050" dirty="0">
+                <a:solidFill>
+                  <a:srgbClr val="7030A0"/>
+                </a:solidFill>
+              </a:rPr>
+              <a:t>&lt;&lt;enumeration&gt;&gt;Category</a:t>
+            </a:r>
+            <a:endParaRPr lang="en-SG" sz="1050" dirty="0">
+              <a:solidFill>
+                <a:srgbClr val="7030A0"/>
+              </a:solidFill>
+            </a:endParaRPr>
+          </a:p>
+        </p:txBody>
+      </p:sp>
       <p:cxnSp>
         <p:nvCxnSpPr>
-          <p:cNvPr id="81" name="Elbow Connector 80"/>
+          <p:cNvPr id="86" name="Elbow Connector 85"/>
           <p:cNvCxnSpPr>
+            <a:cxnSpLocks/>
             <a:stCxn id="78" idx="3"/>
-            <a:endCxn id="80" idx="1"/>
+            <a:endCxn id="85" idx="1"/>
           </p:cNvCxnSpPr>
           <p:nvPr/>
         </p:nvCxnSpPr>
         <p:spPr>
-          <a:xfrm flipV="1">
-            <a:off x="6246501" y="3519818"/>
-            <a:ext cx="434402" cy="4783"/>
+          <a:xfrm>
+            <a:off x="6272852" y="2117667"/>
+            <a:ext cx="571179" cy="1218847"/>
           </a:xfrm>
           <a:prstGeom prst="bentConnector3">
             <a:avLst/>
@@ -4027,14 +4147,98 @@
       </p:cxnSp>
       <p:sp>
         <p:nvSpPr>
-          <p:cNvPr id="83" name="Rectangle 8"/>
+          <p:cNvPr id="54" name="TextBox 53"/>
+          <p:cNvSpPr txBox="1"/>
+          <p:nvPr/>
+        </p:nvSpPr>
+        <p:spPr>
+          <a:xfrm>
+            <a:off x="3569450" y="2630134"/>
+            <a:ext cx="189257" cy="178683"/>
+          </a:xfrm>
+          <a:prstGeom prst="rect">
+            <a:avLst/>
+          </a:prstGeom>
+          <a:noFill/>
+        </p:spPr>
+        <p:txBody>
+          <a:bodyPr wrap="square" lIns="0" tIns="0" rIns="0" bIns="0" rtlCol="0">
+            <a:noAutofit/>
+          </a:bodyPr>
+          <a:lstStyle/>
+          <a:p>
+            <a:pPr algn="ctr"/>
+            <a:r>
+              <a:rPr lang="en-US" sz="1100" dirty="0">
+                <a:solidFill>
+                  <a:srgbClr val="7030A0"/>
+                </a:solidFill>
+              </a:rPr>
+              <a:t>1</a:t>
+            </a:r>
+            <a:endParaRPr lang="en-SG" sz="1100" dirty="0">
+              <a:solidFill>
+                <a:srgbClr val="7030A0"/>
+              </a:solidFill>
+            </a:endParaRPr>
+          </a:p>
+        </p:txBody>
+      </p:sp>
+      <p:sp>
+        <p:nvSpPr>
+          <p:cNvPr id="61" name="TextBox 60"/>
+          <p:cNvSpPr txBox="1"/>
+          <p:nvPr/>
+        </p:nvSpPr>
+        <p:spPr>
+          <a:xfrm>
+            <a:off x="5176152" y="2451451"/>
+            <a:ext cx="189257" cy="178683"/>
+          </a:xfrm>
+          <a:prstGeom prst="rect">
+            <a:avLst/>
+          </a:prstGeom>
+          <a:noFill/>
+        </p:spPr>
+        <p:txBody>
+          <a:bodyPr wrap="square" lIns="0" tIns="0" rIns="0" bIns="0" rtlCol="0">
+            <a:noAutofit/>
+          </a:bodyPr>
+          <a:lstStyle/>
+          <a:p>
+            <a:pPr algn="ctr"/>
+            <a:r>
+              <a:rPr lang="en-US" sz="1100" dirty="0">
+                <a:solidFill>
+                  <a:srgbClr val="7030A0"/>
+                </a:solidFill>
+              </a:rPr>
+              <a:t>*</a:t>
+            </a:r>
+            <a:endParaRPr lang="en-SG" sz="1100" dirty="0">
+              <a:solidFill>
+                <a:srgbClr val="7030A0"/>
+              </a:solidFill>
+            </a:endParaRPr>
+          </a:p>
+        </p:txBody>
+      </p:sp>
+      <p:sp>
+        <p:nvSpPr>
+          <p:cNvPr id="52" name="Rectangle 8">
+            <a:extLst>
+              <a:ext uri="{FF2B5EF4-FFF2-40B4-BE49-F238E27FC236}">
+                <a16:creationId xmlns:a16="http://schemas.microsoft.com/office/drawing/2014/main" id="{ABDCDBD2-131A-4B66-A2F2-43BBEE82C773}"/>
+              </a:ext>
+            </a:extLst>
+          </p:cNvPr>
           <p:cNvSpPr/>
           <p:nvPr/>
         </p:nvSpPr>
         <p:spPr>
           <a:xfrm>
-            <a:off x="6680903" y="3699904"/>
-            <a:ext cx="708186" cy="285783"/>
+            <a:off x="3729997" y="1991561"/>
+            <a:ext cx="1156969" cy="285783"/>
           </a:xfrm>
           <a:prstGeom prst="rect">
             <a:avLst/>
@@ -4066,12 +4270,12 @@
           <a:p>
             <a:pPr algn="ctr"/>
             <a:r>
-              <a:rPr lang="en-US" sz="1050" dirty="0">
+              <a:rPr lang="en-US" sz="1050" dirty="0" err="1">
                 <a:solidFill>
                   <a:srgbClr val="7030A0"/>
                 </a:solidFill>
               </a:rPr>
-              <a:t>Email</a:t>
+              <a:t>ExpenseList</a:t>
             </a:r>
             <a:endParaRPr lang="en-SG" sz="1050" dirty="0">
               <a:solidFill>
@@ -4083,20 +4287,29 @@
       </p:sp>
       <p:cxnSp>
         <p:nvCxnSpPr>
-          <p:cNvPr id="84" name="Elbow Connector 83"/>
+          <p:cNvPr id="53" name="Elbow Connector 78">
+            <a:extLst>
+              <a:ext uri="{FF2B5EF4-FFF2-40B4-BE49-F238E27FC236}">
+                <a16:creationId xmlns:a16="http://schemas.microsoft.com/office/drawing/2014/main" id="{B97967F8-618A-448B-81FD-CDFD4AF0EC64}"/>
+              </a:ext>
+            </a:extLst>
+          </p:cNvPr>
           <p:cNvCxnSpPr>
-            <a:stCxn id="78" idx="3"/>
-            <a:endCxn id="83" idx="1"/>
+            <a:cxnSpLocks/>
+            <a:stCxn id="51" idx="3"/>
+            <a:endCxn id="52" idx="1"/>
           </p:cNvCxnSpPr>
           <p:nvPr/>
         </p:nvCxnSpPr>
         <p:spPr>
-          <a:xfrm>
-            <a:off x="6246501" y="3524601"/>
-            <a:ext cx="434402" cy="318195"/>
+          <a:xfrm flipV="1">
+            <a:off x="3286303" y="2134453"/>
+            <a:ext cx="443694" cy="669612"/>
           </a:xfrm>
           <a:prstGeom prst="bentConnector3">
-            <a:avLst/>
+            <a:avLst>
+              <a:gd name="adj1" fmla="val 50000"/>
+            </a:avLst>
           </a:prstGeom>
           <a:ln w="19050">
             <a:solidFill>
@@ -4122,76 +4335,26 @@
           </a:fontRef>
         </p:style>
       </p:cxnSp>
-      <p:sp>
-        <p:nvSpPr>
-          <p:cNvPr id="85" name="Rectangle 8"/>
-          <p:cNvSpPr/>
-          <p:nvPr/>
-        </p:nvSpPr>
-        <p:spPr>
-          <a:xfrm>
-            <a:off x="6680903" y="4022881"/>
-            <a:ext cx="708186" cy="285783"/>
-          </a:xfrm>
-          <a:prstGeom prst="rect">
-            <a:avLst/>
-          </a:prstGeom>
-          <a:ln w="19050">
-            <a:solidFill>
-              <a:srgbClr val="7030A0"/>
-            </a:solidFill>
-          </a:ln>
-          <a:effectLst/>
-        </p:spPr>
-        <p:style>
-          <a:lnRef idx="1">
-            <a:schemeClr val="accent4"/>
-          </a:lnRef>
-          <a:fillRef idx="2">
-            <a:schemeClr val="accent4"/>
-          </a:fillRef>
-          <a:effectRef idx="1">
-            <a:schemeClr val="accent4"/>
-          </a:effectRef>
-          <a:fontRef idx="minor">
-            <a:schemeClr val="dk1"/>
-          </a:fontRef>
-        </p:style>
-        <p:txBody>
-          <a:bodyPr rtlCol="0" anchor="ctr"/>
-          <a:lstStyle/>
-          <a:p>
-            <a:pPr algn="ctr"/>
-            <a:r>
-              <a:rPr lang="en-US" sz="1050" dirty="0">
-                <a:solidFill>
-                  <a:srgbClr val="7030A0"/>
-                </a:solidFill>
-              </a:rPr>
-              <a:t>Address</a:t>
-            </a:r>
-            <a:endParaRPr lang="en-SG" sz="1050" dirty="0">
-              <a:solidFill>
-                <a:srgbClr val="7030A0"/>
-              </a:solidFill>
-            </a:endParaRPr>
-          </a:p>
-        </p:txBody>
-      </p:sp>
       <p:cxnSp>
         <p:nvCxnSpPr>
-          <p:cNvPr id="86" name="Elbow Connector 85"/>
+          <p:cNvPr id="59" name="Elbow Connector 63">
+            <a:extLst>
+              <a:ext uri="{FF2B5EF4-FFF2-40B4-BE49-F238E27FC236}">
+                <a16:creationId xmlns:a16="http://schemas.microsoft.com/office/drawing/2014/main" id="{E2D6A56C-A223-4236-A1F0-7EFEBA2FC940}"/>
+              </a:ext>
+            </a:extLst>
+          </p:cNvPr>
           <p:cNvCxnSpPr>
             <a:cxnSpLocks/>
-            <a:stCxn id="78" idx="3"/>
-            <a:endCxn id="85" idx="1"/>
+            <a:stCxn id="71" idx="3"/>
+            <a:endCxn id="67" idx="1"/>
           </p:cNvCxnSpPr>
           <p:nvPr/>
         </p:nvCxnSpPr>
         <p:spPr>
           <a:xfrm>
-            <a:off x="6246501" y="3524601"/>
-            <a:ext cx="434402" cy="641172"/>
+            <a:off x="5115883" y="2117945"/>
+            <a:ext cx="214777" cy="197"/>
           </a:xfrm>
           <a:prstGeom prst="bentConnector3">
             <a:avLst/>
@@ -4222,88 +4385,10 @@
       </p:cxnSp>
       <p:sp>
         <p:nvSpPr>
-          <p:cNvPr id="54" name="TextBox 53"/>
-          <p:cNvSpPr txBox="1"/>
-          <p:nvPr/>
-        </p:nvSpPr>
-        <p:spPr>
-          <a:xfrm>
-            <a:off x="3293478" y="3548574"/>
-            <a:ext cx="189257" cy="178683"/>
-          </a:xfrm>
-          <a:prstGeom prst="rect">
-            <a:avLst/>
-          </a:prstGeom>
-          <a:noFill/>
-        </p:spPr>
-        <p:txBody>
-          <a:bodyPr wrap="square" lIns="0" tIns="0" rIns="0" bIns="0" rtlCol="0">
-            <a:noAutofit/>
-          </a:bodyPr>
-          <a:lstStyle/>
-          <a:p>
-            <a:pPr algn="ctr"/>
-            <a:r>
-              <a:rPr lang="en-US" sz="1100" dirty="0">
-                <a:solidFill>
-                  <a:srgbClr val="7030A0"/>
-                </a:solidFill>
-              </a:rPr>
-              <a:t>1</a:t>
-            </a:r>
-            <a:endParaRPr lang="en-SG" sz="1100" dirty="0">
-              <a:solidFill>
-                <a:srgbClr val="7030A0"/>
-              </a:solidFill>
-            </a:endParaRPr>
-          </a:p>
-        </p:txBody>
-      </p:sp>
-      <p:sp>
-        <p:nvSpPr>
-          <p:cNvPr id="61" name="TextBox 60"/>
-          <p:cNvSpPr txBox="1"/>
-          <p:nvPr/>
-        </p:nvSpPr>
-        <p:spPr>
-          <a:xfrm>
-            <a:off x="5103762" y="3587627"/>
-            <a:ext cx="189257" cy="178683"/>
-          </a:xfrm>
-          <a:prstGeom prst="rect">
-            <a:avLst/>
-          </a:prstGeom>
-          <a:noFill/>
-        </p:spPr>
-        <p:txBody>
-          <a:bodyPr wrap="square" lIns="0" tIns="0" rIns="0" bIns="0" rtlCol="0">
-            <a:noAutofit/>
-          </a:bodyPr>
-          <a:lstStyle/>
-          <a:p>
-            <a:pPr algn="ctr"/>
-            <a:r>
-              <a:rPr lang="en-US" sz="1100" dirty="0">
-                <a:solidFill>
-                  <a:srgbClr val="7030A0"/>
-                </a:solidFill>
-              </a:rPr>
-              <a:t>*</a:t>
-            </a:r>
-            <a:endParaRPr lang="en-SG" sz="1100" dirty="0">
-              <a:solidFill>
-                <a:srgbClr val="7030A0"/>
-              </a:solidFill>
-            </a:endParaRPr>
-          </a:p>
-        </p:txBody>
-      </p:sp>
-      <p:sp>
-        <p:nvSpPr>
-          <p:cNvPr id="52" name="Rectangle 8">
+          <p:cNvPr id="67" name="Rectangle 8">
             <a:extLst>
               <a:ext uri="{FF2B5EF4-FFF2-40B4-BE49-F238E27FC236}">
-                <a16:creationId xmlns:a16="http://schemas.microsoft.com/office/drawing/2014/main" id="{ABDCDBD2-131A-4B66-A2F2-43BBEE82C773}"/>
+                <a16:creationId xmlns:a16="http://schemas.microsoft.com/office/drawing/2014/main" id="{36D68104-33BB-4C8F-B764-F3F0B25E592B}"/>
               </a:ext>
             </a:extLst>
           </p:cNvPr>
@@ -4312,8 +4397,8 @@
         </p:nvSpPr>
         <p:spPr>
           <a:xfrm>
-            <a:off x="3724378" y="2696571"/>
-            <a:ext cx="1156969" cy="285783"/>
+            <a:off x="5330660" y="1975250"/>
+            <a:ext cx="708186" cy="285783"/>
           </a:xfrm>
           <a:prstGeom prst="rect">
             <a:avLst/>
@@ -4345,12 +4430,217 @@
           <a:p>
             <a:pPr algn="ctr"/>
             <a:r>
+              <a:rPr lang="en-US" sz="1050" dirty="0">
+                <a:solidFill>
+                  <a:srgbClr val="7030A0"/>
+                </a:solidFill>
+              </a:rPr>
+              <a:t>Expense</a:t>
+            </a:r>
+            <a:endParaRPr lang="en-SG" sz="1050" dirty="0">
+              <a:solidFill>
+                <a:srgbClr val="7030A0"/>
+              </a:solidFill>
+            </a:endParaRPr>
+          </a:p>
+        </p:txBody>
+      </p:sp>
+      <p:sp>
+        <p:nvSpPr>
+          <p:cNvPr id="68" name="TextBox 67">
+            <a:extLst>
+              <a:ext uri="{FF2B5EF4-FFF2-40B4-BE49-F238E27FC236}">
+                <a16:creationId xmlns:a16="http://schemas.microsoft.com/office/drawing/2014/main" id="{18A2ABF0-4DA8-43EE-BACE-A737C4E4CFEC}"/>
+              </a:ext>
+            </a:extLst>
+          </p:cNvPr>
+          <p:cNvSpPr txBox="1"/>
+          <p:nvPr/>
+        </p:nvSpPr>
+        <p:spPr>
+          <a:xfrm>
+            <a:off x="5177081" y="1956273"/>
+            <a:ext cx="189257" cy="178683"/>
+          </a:xfrm>
+          <a:prstGeom prst="rect">
+            <a:avLst/>
+          </a:prstGeom>
+          <a:noFill/>
+        </p:spPr>
+        <p:txBody>
+          <a:bodyPr wrap="square" lIns="0" tIns="0" rIns="0" bIns="0" rtlCol="0">
+            <a:noAutofit/>
+          </a:bodyPr>
+          <a:lstStyle/>
+          <a:p>
+            <a:pPr algn="ctr"/>
+            <a:r>
+              <a:rPr lang="en-US" sz="1100" dirty="0">
+                <a:solidFill>
+                  <a:srgbClr val="7030A0"/>
+                </a:solidFill>
+              </a:rPr>
+              <a:t>*</a:t>
+            </a:r>
+            <a:endParaRPr lang="en-SG" sz="1100" dirty="0">
+              <a:solidFill>
+                <a:srgbClr val="7030A0"/>
+              </a:solidFill>
+            </a:endParaRPr>
+          </a:p>
+        </p:txBody>
+      </p:sp>
+      <p:sp>
+        <p:nvSpPr>
+          <p:cNvPr id="69" name="TextBox 68">
+            <a:extLst>
+              <a:ext uri="{FF2B5EF4-FFF2-40B4-BE49-F238E27FC236}">
+                <a16:creationId xmlns:a16="http://schemas.microsoft.com/office/drawing/2014/main" id="{8CF9406A-39C7-4163-8880-BB65541FC08E}"/>
+              </a:ext>
+            </a:extLst>
+          </p:cNvPr>
+          <p:cNvSpPr txBox="1"/>
+          <p:nvPr/>
+        </p:nvSpPr>
+        <p:spPr>
+          <a:xfrm>
+            <a:off x="3505039" y="1912425"/>
+            <a:ext cx="189257" cy="178683"/>
+          </a:xfrm>
+          <a:prstGeom prst="rect">
+            <a:avLst/>
+          </a:prstGeom>
+          <a:noFill/>
+        </p:spPr>
+        <p:txBody>
+          <a:bodyPr wrap="square" lIns="0" tIns="0" rIns="0" bIns="0" rtlCol="0">
+            <a:noAutofit/>
+          </a:bodyPr>
+          <a:lstStyle/>
+          <a:p>
+            <a:pPr algn="ctr"/>
+            <a:r>
+              <a:rPr lang="en-US" sz="1100" dirty="0">
+                <a:solidFill>
+                  <a:srgbClr val="7030A0"/>
+                </a:solidFill>
+              </a:rPr>
+              <a:t>1</a:t>
+            </a:r>
+            <a:endParaRPr lang="en-SG" sz="1100" dirty="0">
+              <a:solidFill>
+                <a:srgbClr val="7030A0"/>
+              </a:solidFill>
+            </a:endParaRPr>
+          </a:p>
+        </p:txBody>
+      </p:sp>
+      <p:sp>
+        <p:nvSpPr>
+          <p:cNvPr id="71" name="Flowchart: Decision 96">
+            <a:extLst>
+              <a:ext uri="{FF2B5EF4-FFF2-40B4-BE49-F238E27FC236}">
+                <a16:creationId xmlns:a16="http://schemas.microsoft.com/office/drawing/2014/main" id="{233007D4-EEA2-4CA6-ACFE-1517B654224E}"/>
+              </a:ext>
+            </a:extLst>
+          </p:cNvPr>
+          <p:cNvSpPr/>
+          <p:nvPr/>
+        </p:nvSpPr>
+        <p:spPr>
+          <a:xfrm>
+            <a:off x="4879835" y="2031255"/>
+            <a:ext cx="236048" cy="173380"/>
+          </a:xfrm>
+          <a:prstGeom prst="flowChartDecision">
+            <a:avLst/>
+          </a:prstGeom>
+          <a:solidFill>
+            <a:srgbClr val="7030A0"/>
+          </a:solidFill>
+          <a:ln w="19050">
+            <a:solidFill>
+              <a:srgbClr val="7030A0"/>
+            </a:solidFill>
+          </a:ln>
+          <a:effectLst/>
+        </p:spPr>
+        <p:style>
+          <a:lnRef idx="1">
+            <a:schemeClr val="accent6"/>
+          </a:lnRef>
+          <a:fillRef idx="2">
+            <a:schemeClr val="accent6"/>
+          </a:fillRef>
+          <a:effectRef idx="1">
+            <a:schemeClr val="accent6"/>
+          </a:effectRef>
+          <a:fontRef idx="minor">
+            <a:schemeClr val="dk1"/>
+          </a:fontRef>
+        </p:style>
+        <p:txBody>
+          <a:bodyPr rtlCol="0" anchor="ctr"/>
+          <a:lstStyle/>
+          <a:p>
+            <a:pPr algn="ctr"/>
+            <a:endParaRPr lang="en-US" sz="1050"/>
+          </a:p>
+        </p:txBody>
+      </p:sp>
+      <p:sp>
+        <p:nvSpPr>
+          <p:cNvPr id="35" name="Rectangle 8">
+            <a:extLst>
+              <a:ext uri="{FF2B5EF4-FFF2-40B4-BE49-F238E27FC236}">
+                <a16:creationId xmlns:a16="http://schemas.microsoft.com/office/drawing/2014/main" id="{99FF1B75-AAEE-42F0-AA03-BCD4B6554002}"/>
+              </a:ext>
+            </a:extLst>
+          </p:cNvPr>
+          <p:cNvSpPr/>
+          <p:nvPr/>
+        </p:nvSpPr>
+        <p:spPr>
+          <a:xfrm>
+            <a:off x="3738623" y="2975046"/>
+            <a:ext cx="1156969" cy="285784"/>
+          </a:xfrm>
+          <a:prstGeom prst="rect">
+            <a:avLst/>
+          </a:prstGeom>
+          <a:ln w="19050">
+            <a:solidFill>
+              <a:srgbClr val="7030A0"/>
+            </a:solidFill>
+          </a:ln>
+          <a:effectLst/>
+        </p:spPr>
+        <p:style>
+          <a:lnRef idx="1">
+            <a:schemeClr val="accent4"/>
+          </a:lnRef>
+          <a:fillRef idx="2">
+            <a:schemeClr val="accent4"/>
+          </a:fillRef>
+          <a:effectRef idx="1">
+            <a:schemeClr val="accent4"/>
+          </a:effectRef>
+          <a:fontRef idx="minor">
+            <a:schemeClr val="dk1"/>
+          </a:fontRef>
+        </p:style>
+        <p:txBody>
+          <a:bodyPr rtlCol="0" anchor="ctr"/>
+          <a:lstStyle/>
+          <a:p>
+            <a:pPr algn="ctr"/>
+            <a:r>
               <a:rPr lang="en-US" sz="1050" dirty="0" err="1">
                 <a:solidFill>
                   <a:srgbClr val="7030A0"/>
                 </a:solidFill>
               </a:rPr>
-              <a:t>UniqueTagList</a:t>
+              <a:t>DebtList</a:t>
             </a:r>
             <a:endParaRPr lang="en-SG" sz="1050" dirty="0">
               <a:solidFill>
@@ -4360,29 +4650,93 @@
           </a:p>
         </p:txBody>
       </p:sp>
+      <p:sp>
+        <p:nvSpPr>
+          <p:cNvPr id="36" name="Rectangle 8">
+            <a:extLst>
+              <a:ext uri="{FF2B5EF4-FFF2-40B4-BE49-F238E27FC236}">
+                <a16:creationId xmlns:a16="http://schemas.microsoft.com/office/drawing/2014/main" id="{E67315BD-06D1-420A-B663-FCA190B07840}"/>
+              </a:ext>
+            </a:extLst>
+          </p:cNvPr>
+          <p:cNvSpPr/>
+          <p:nvPr/>
+        </p:nvSpPr>
+        <p:spPr>
+          <a:xfrm>
+            <a:off x="3731547" y="3454279"/>
+            <a:ext cx="1156969" cy="285784"/>
+          </a:xfrm>
+          <a:prstGeom prst="rect">
+            <a:avLst/>
+          </a:prstGeom>
+          <a:ln w="19050">
+            <a:solidFill>
+              <a:srgbClr val="7030A0"/>
+            </a:solidFill>
+          </a:ln>
+          <a:effectLst/>
+        </p:spPr>
+        <p:style>
+          <a:lnRef idx="1">
+            <a:schemeClr val="accent4"/>
+          </a:lnRef>
+          <a:fillRef idx="2">
+            <a:schemeClr val="accent4"/>
+          </a:fillRef>
+          <a:effectRef idx="1">
+            <a:schemeClr val="accent4"/>
+          </a:effectRef>
+          <a:fontRef idx="minor">
+            <a:schemeClr val="dk1"/>
+          </a:fontRef>
+        </p:style>
+        <p:txBody>
+          <a:bodyPr rtlCol="0" anchor="ctr"/>
+          <a:lstStyle/>
+          <a:p>
+            <a:pPr algn="ctr"/>
+            <a:r>
+              <a:rPr lang="en-US" sz="1050" dirty="0" err="1">
+                <a:solidFill>
+                  <a:srgbClr val="7030A0"/>
+                </a:solidFill>
+              </a:rPr>
+              <a:t>BudgetList</a:t>
+            </a:r>
+            <a:endParaRPr lang="en-SG" sz="1050" dirty="0">
+              <a:solidFill>
+                <a:srgbClr val="7030A0"/>
+              </a:solidFill>
+            </a:endParaRPr>
+          </a:p>
+        </p:txBody>
+      </p:sp>
       <p:cxnSp>
         <p:nvCxnSpPr>
-          <p:cNvPr id="53" name="Elbow Connector 78">
+          <p:cNvPr id="41" name="Elbow Connector 29">
             <a:extLst>
               <a:ext uri="{FF2B5EF4-FFF2-40B4-BE49-F238E27FC236}">
-                <a16:creationId xmlns:a16="http://schemas.microsoft.com/office/drawing/2014/main" id="{B97967F8-618A-448B-81FD-CDFD4AF0EC64}"/>
+                <a16:creationId xmlns:a16="http://schemas.microsoft.com/office/drawing/2014/main" id="{30068963-1EAB-4B09-801F-596FB4D5AF0D}"/>
               </a:ext>
             </a:extLst>
           </p:cNvPr>
           <p:cNvCxnSpPr>
             <a:cxnSpLocks/>
-            <a:stCxn id="54" idx="0"/>
-            <a:endCxn id="52" idx="1"/>
+            <a:stCxn id="51" idx="3"/>
+            <a:endCxn id="35" idx="1"/>
           </p:cNvCxnSpPr>
           <p:nvPr/>
         </p:nvCxnSpPr>
         <p:spPr>
-          <a:xfrm rot="5400000" flipH="1" flipV="1">
-            <a:off x="3201687" y="3025884"/>
-            <a:ext cx="709111" cy="336271"/>
-          </a:xfrm>
-          <a:prstGeom prst="bentConnector2">
-            <a:avLst/>
+          <a:xfrm>
+            <a:off x="3286303" y="2804065"/>
+            <a:ext cx="452320" cy="313873"/>
+          </a:xfrm>
+          <a:prstGeom prst="bentConnector3">
+            <a:avLst>
+              <a:gd name="adj1" fmla="val 50000"/>
+            </a:avLst>
           </a:prstGeom>
           <a:ln w="19050">
             <a:solidFill>
@@ -4410,10 +4764,10 @@
       </p:cxnSp>
       <p:sp>
         <p:nvSpPr>
-          <p:cNvPr id="50" name="TextBox 49">
+          <p:cNvPr id="48" name="TextBox 47">
             <a:extLst>
               <a:ext uri="{FF2B5EF4-FFF2-40B4-BE49-F238E27FC236}">
-                <a16:creationId xmlns:a16="http://schemas.microsoft.com/office/drawing/2014/main" id="{B3FA9D57-880F-49C4-AD0B-A64E30D6F403}"/>
+                <a16:creationId xmlns:a16="http://schemas.microsoft.com/office/drawing/2014/main" id="{5767AE1F-0E47-4132-9B7A-6641DCE372DE}"/>
               </a:ext>
             </a:extLst>
           </p:cNvPr>
@@ -4422,7 +4776,7 @@
         </p:nvSpPr>
         <p:spPr>
           <a:xfrm>
-            <a:off x="5682850" y="2920431"/>
+            <a:off x="3564410" y="2910357"/>
             <a:ext cx="189257" cy="178683"/>
           </a:xfrm>
           <a:prstGeom prst="rect">
@@ -4443,7 +4797,7 @@
                   <a:srgbClr val="7030A0"/>
                 </a:solidFill>
               </a:rPr>
-              <a:t>*</a:t>
+              <a:t>1</a:t>
             </a:r>
             <a:endParaRPr lang="en-SG" sz="1100" dirty="0">
               <a:solidFill>
@@ -4453,79 +4807,31 @@
           </a:p>
         </p:txBody>
       </p:sp>
-      <p:sp>
-        <p:nvSpPr>
-          <p:cNvPr id="55" name="Flowchart: Decision 96">
+      <p:cxnSp>
+        <p:nvCxnSpPr>
+          <p:cNvPr id="56" name="Elbow Connector 29">
             <a:extLst>
               <a:ext uri="{FF2B5EF4-FFF2-40B4-BE49-F238E27FC236}">
-                <a16:creationId xmlns:a16="http://schemas.microsoft.com/office/drawing/2014/main" id="{B9F96195-942D-4692-91B7-CF34229E7461}"/>
-              </a:ext>
-            </a:extLst>
-          </p:cNvPr>
-          <p:cNvSpPr/>
-          <p:nvPr/>
-        </p:nvSpPr>
-        <p:spPr>
-          <a:xfrm rot="16200000">
-            <a:off x="5521988" y="3154431"/>
-            <a:ext cx="236048" cy="173380"/>
-          </a:xfrm>
-          <a:prstGeom prst="flowChartDecision">
-            <a:avLst/>
-          </a:prstGeom>
-          <a:noFill/>
-          <a:ln w="19050">
-            <a:solidFill>
-              <a:srgbClr val="7030A0"/>
-            </a:solidFill>
-          </a:ln>
-          <a:effectLst/>
-        </p:spPr>
-        <p:style>
-          <a:lnRef idx="1">
-            <a:schemeClr val="accent6"/>
-          </a:lnRef>
-          <a:fillRef idx="2">
-            <a:schemeClr val="accent6"/>
-          </a:fillRef>
-          <a:effectRef idx="1">
-            <a:schemeClr val="accent6"/>
-          </a:effectRef>
-          <a:fontRef idx="minor">
-            <a:schemeClr val="dk1"/>
-          </a:fontRef>
-        </p:style>
-        <p:txBody>
-          <a:bodyPr rtlCol="0" anchor="ctr"/>
-          <a:lstStyle/>
-          <a:p>
-            <a:pPr algn="ctr"/>
-            <a:endParaRPr lang="en-US" sz="1050"/>
-          </a:p>
-        </p:txBody>
-      </p:sp>
-      <p:cxnSp>
-        <p:nvCxnSpPr>
-          <p:cNvPr id="59" name="Elbow Connector 63">
-            <a:extLst>
-              <a:ext uri="{FF2B5EF4-FFF2-40B4-BE49-F238E27FC236}">
-                <a16:creationId xmlns:a16="http://schemas.microsoft.com/office/drawing/2014/main" id="{E2D6A56C-A223-4236-A1F0-7EFEBA2FC940}"/>
+                <a16:creationId xmlns:a16="http://schemas.microsoft.com/office/drawing/2014/main" id="{4458C6DE-50E3-4DC7-8AE5-88E4D9F4DA6B}"/>
               </a:ext>
             </a:extLst>
           </p:cNvPr>
           <p:cNvCxnSpPr>
             <a:cxnSpLocks/>
-            <a:endCxn id="67" idx="1"/>
+            <a:stCxn id="51" idx="3"/>
+            <a:endCxn id="36" idx="1"/>
           </p:cNvCxnSpPr>
           <p:nvPr/>
         </p:nvCxnSpPr>
         <p:spPr>
-          <a:xfrm flipV="1">
-            <a:off x="4852786" y="2722716"/>
-            <a:ext cx="432916" cy="111294"/>
+          <a:xfrm>
+            <a:off x="3286303" y="2804065"/>
+            <a:ext cx="445244" cy="793106"/>
           </a:xfrm>
           <a:prstGeom prst="bentConnector3">
-            <a:avLst/>
+            <a:avLst>
+              <a:gd name="adj1" fmla="val 50000"/>
+            </a:avLst>
           </a:prstGeom>
           <a:ln w="19050">
             <a:solidFill>
@@ -4553,10 +4859,178 @@
       </p:cxnSp>
       <p:sp>
         <p:nvSpPr>
-          <p:cNvPr id="67" name="Rectangle 8">
+          <p:cNvPr id="57" name="TextBox 56">
             <a:extLst>
               <a:ext uri="{FF2B5EF4-FFF2-40B4-BE49-F238E27FC236}">
-                <a16:creationId xmlns:a16="http://schemas.microsoft.com/office/drawing/2014/main" id="{36D68104-33BB-4C8F-B764-F3F0B25E592B}"/>
+                <a16:creationId xmlns:a16="http://schemas.microsoft.com/office/drawing/2014/main" id="{3C6A3531-575B-45C6-A6AE-6E13AD860241}"/>
+              </a:ext>
+            </a:extLst>
+          </p:cNvPr>
+          <p:cNvSpPr txBox="1"/>
+          <p:nvPr/>
+        </p:nvSpPr>
+        <p:spPr>
+          <a:xfrm>
+            <a:off x="3495393" y="3635727"/>
+            <a:ext cx="189257" cy="178683"/>
+          </a:xfrm>
+          <a:prstGeom prst="rect">
+            <a:avLst/>
+          </a:prstGeom>
+          <a:noFill/>
+        </p:spPr>
+        <p:txBody>
+          <a:bodyPr wrap="square" lIns="0" tIns="0" rIns="0" bIns="0" rtlCol="0">
+            <a:noAutofit/>
+          </a:bodyPr>
+          <a:lstStyle/>
+          <a:p>
+            <a:pPr algn="ctr"/>
+            <a:r>
+              <a:rPr lang="en-US" sz="1100" dirty="0">
+                <a:solidFill>
+                  <a:srgbClr val="7030A0"/>
+                </a:solidFill>
+              </a:rPr>
+              <a:t>1</a:t>
+            </a:r>
+            <a:endParaRPr lang="en-SG" sz="1100" dirty="0">
+              <a:solidFill>
+                <a:srgbClr val="7030A0"/>
+              </a:solidFill>
+            </a:endParaRPr>
+          </a:p>
+        </p:txBody>
+      </p:sp>
+      <p:grpSp>
+        <p:nvGrpSpPr>
+          <p:cNvPr id="94" name="Group 93">
+            <a:extLst>
+              <a:ext uri="{FF2B5EF4-FFF2-40B4-BE49-F238E27FC236}">
+                <a16:creationId xmlns:a16="http://schemas.microsoft.com/office/drawing/2014/main" id="{2C16A590-2BB3-4561-8397-F71EA4CAE54A}"/>
+              </a:ext>
+            </a:extLst>
+          </p:cNvPr>
+          <p:cNvGrpSpPr/>
+          <p:nvPr/>
+        </p:nvGrpSpPr>
+        <p:grpSpPr>
+          <a:xfrm>
+            <a:off x="5627736" y="2263462"/>
+            <a:ext cx="110227" cy="213864"/>
+            <a:chOff x="5627736" y="2263462"/>
+            <a:chExt cx="110227" cy="213864"/>
+          </a:xfrm>
+        </p:grpSpPr>
+        <p:cxnSp>
+          <p:nvCxnSpPr>
+            <p:cNvPr id="72" name="Elbow Connector 78">
+              <a:extLst>
+                <a:ext uri="{FF2B5EF4-FFF2-40B4-BE49-F238E27FC236}">
+                  <a16:creationId xmlns:a16="http://schemas.microsoft.com/office/drawing/2014/main" id="{D5DFB8C5-B0B0-46C1-967B-4449112ABD6F}"/>
+                </a:ext>
+              </a:extLst>
+            </p:cNvPr>
+            <p:cNvCxnSpPr>
+              <a:cxnSpLocks/>
+              <a:stCxn id="62" idx="0"/>
+              <a:endCxn id="90" idx="3"/>
+            </p:cNvCxnSpPr>
+            <p:nvPr/>
+          </p:nvCxnSpPr>
+          <p:spPr>
+            <a:xfrm rot="16200000" flipV="1">
+              <a:off x="5627914" y="2417146"/>
+              <a:ext cx="115116" cy="5243"/>
+            </a:xfrm>
+            <a:prstGeom prst="bentConnector3">
+              <a:avLst>
+                <a:gd name="adj1" fmla="val 50000"/>
+              </a:avLst>
+            </a:prstGeom>
+            <a:ln w="19050">
+              <a:solidFill>
+                <a:srgbClr val="7030A0"/>
+              </a:solidFill>
+              <a:headEnd type="none" w="med" len="med"/>
+              <a:tailEnd type="none" w="med" len="med"/>
+            </a:ln>
+            <a:effectLst/>
+          </p:spPr>
+          <p:style>
+            <a:lnRef idx="1">
+              <a:schemeClr val="accent2"/>
+            </a:lnRef>
+            <a:fillRef idx="2">
+              <a:schemeClr val="accent2"/>
+            </a:fillRef>
+            <a:effectRef idx="1">
+              <a:schemeClr val="accent2"/>
+            </a:effectRef>
+            <a:fontRef idx="minor">
+              <a:schemeClr val="dk1"/>
+            </a:fontRef>
+          </p:style>
+        </p:cxnSp>
+        <p:sp>
+          <p:nvSpPr>
+            <p:cNvPr id="90" name="Isosceles Triangle 89">
+              <a:extLst>
+                <a:ext uri="{FF2B5EF4-FFF2-40B4-BE49-F238E27FC236}">
+                  <a16:creationId xmlns:a16="http://schemas.microsoft.com/office/drawing/2014/main" id="{3A51D1D8-B94D-4B1E-B056-B36BFB88B757}"/>
+                </a:ext>
+              </a:extLst>
+            </p:cNvPr>
+            <p:cNvSpPr/>
+            <p:nvPr/>
+          </p:nvSpPr>
+          <p:spPr>
+            <a:xfrm>
+              <a:off x="5627736" y="2263462"/>
+              <a:ext cx="110227" cy="98748"/>
+            </a:xfrm>
+            <a:prstGeom prst="triangle">
+              <a:avLst/>
+            </a:prstGeom>
+            <a:noFill/>
+            <a:ln>
+              <a:solidFill>
+                <a:srgbClr val="7030A0"/>
+              </a:solidFill>
+            </a:ln>
+          </p:spPr>
+          <p:style>
+            <a:lnRef idx="2">
+              <a:schemeClr val="accent1">
+                <a:shade val="50000"/>
+              </a:schemeClr>
+            </a:lnRef>
+            <a:fillRef idx="1">
+              <a:schemeClr val="accent1"/>
+            </a:fillRef>
+            <a:effectRef idx="0">
+              <a:schemeClr val="accent1"/>
+            </a:effectRef>
+            <a:fontRef idx="minor">
+              <a:schemeClr val="lt1"/>
+            </a:fontRef>
+          </p:style>
+          <p:txBody>
+            <a:bodyPr rtlCol="0" anchor="ctr"/>
+            <a:lstStyle/>
+            <a:p>
+              <a:pPr algn="ctr"/>
+              <a:endParaRPr lang="en-SG"/>
+            </a:p>
+          </p:txBody>
+        </p:sp>
+      </p:grpSp>
+      <p:sp>
+        <p:nvSpPr>
+          <p:cNvPr id="95" name="Rectangle 8">
+            <a:extLst>
+              <a:ext uri="{FF2B5EF4-FFF2-40B4-BE49-F238E27FC236}">
+                <a16:creationId xmlns:a16="http://schemas.microsoft.com/office/drawing/2014/main" id="{F39B63CB-0DCD-4FE6-8A93-9DA2B433E889}"/>
               </a:ext>
             </a:extLst>
           </p:cNvPr>
@@ -4565,8 +5039,8 @@
         </p:nvSpPr>
         <p:spPr>
           <a:xfrm>
-            <a:off x="5285702" y="2549336"/>
-            <a:ext cx="708186" cy="346760"/>
+            <a:off x="5345202" y="2980351"/>
+            <a:ext cx="708186" cy="285783"/>
           </a:xfrm>
           <a:prstGeom prst="rect">
             <a:avLst/>
@@ -4603,7 +5077,7 @@
                   <a:srgbClr val="7030A0"/>
                 </a:solidFill>
               </a:rPr>
-              <a:t>Tag</a:t>
+              <a:t>Debt</a:t>
             </a:r>
             <a:endParaRPr lang="en-SG" sz="1050" dirty="0">
               <a:solidFill>
@@ -4615,10 +5089,10 @@
       </p:sp>
       <p:sp>
         <p:nvSpPr>
-          <p:cNvPr id="68" name="TextBox 67">
+          <p:cNvPr id="96" name="TextBox 95">
             <a:extLst>
               <a:ext uri="{FF2B5EF4-FFF2-40B4-BE49-F238E27FC236}">
-                <a16:creationId xmlns:a16="http://schemas.microsoft.com/office/drawing/2014/main" id="{18A2ABF0-4DA8-43EE-BACE-A737C4E4CFEC}"/>
+                <a16:creationId xmlns:a16="http://schemas.microsoft.com/office/drawing/2014/main" id="{765B6CFF-460F-4616-877D-57F780BB0F01}"/>
               </a:ext>
             </a:extLst>
           </p:cNvPr>
@@ -4627,7 +5101,7 @@
         </p:nvSpPr>
         <p:spPr>
           <a:xfrm>
-            <a:off x="5103762" y="2767724"/>
+            <a:off x="5183402" y="2960870"/>
             <a:ext cx="189257" cy="178683"/>
           </a:xfrm>
           <a:prstGeom prst="rect">
@@ -4660,55 +5134,10 @@
       </p:sp>
       <p:sp>
         <p:nvSpPr>
-          <p:cNvPr id="69" name="TextBox 68">
+          <p:cNvPr id="97" name="Flowchart: Decision 96">
             <a:extLst>
               <a:ext uri="{FF2B5EF4-FFF2-40B4-BE49-F238E27FC236}">
-                <a16:creationId xmlns:a16="http://schemas.microsoft.com/office/drawing/2014/main" id="{8CF9406A-39C7-4163-8880-BB65541FC08E}"/>
-              </a:ext>
-            </a:extLst>
-          </p:cNvPr>
-          <p:cNvSpPr txBox="1"/>
-          <p:nvPr/>
-        </p:nvSpPr>
-        <p:spPr>
-          <a:xfrm>
-            <a:off x="3335606" y="2662682"/>
-            <a:ext cx="189257" cy="178683"/>
-          </a:xfrm>
-          <a:prstGeom prst="rect">
-            <a:avLst/>
-          </a:prstGeom>
-          <a:noFill/>
-        </p:spPr>
-        <p:txBody>
-          <a:bodyPr wrap="square" lIns="0" tIns="0" rIns="0" bIns="0" rtlCol="0">
-            <a:noAutofit/>
-          </a:bodyPr>
-          <a:lstStyle/>
-          <a:p>
-            <a:pPr algn="ctr"/>
-            <a:r>
-              <a:rPr lang="en-US" sz="1100" dirty="0">
-                <a:solidFill>
-                  <a:srgbClr val="7030A0"/>
-                </a:solidFill>
-              </a:rPr>
-              <a:t>1</a:t>
-            </a:r>
-            <a:endParaRPr lang="en-SG" sz="1100" dirty="0">
-              <a:solidFill>
-                <a:srgbClr val="7030A0"/>
-              </a:solidFill>
-            </a:endParaRPr>
-          </a:p>
-        </p:txBody>
-      </p:sp>
-      <p:sp>
-        <p:nvSpPr>
-          <p:cNvPr id="71" name="Flowchart: Decision 96">
-            <a:extLst>
-              <a:ext uri="{FF2B5EF4-FFF2-40B4-BE49-F238E27FC236}">
-                <a16:creationId xmlns:a16="http://schemas.microsoft.com/office/drawing/2014/main" id="{233007D4-EEA2-4CA6-ACFE-1517B654224E}"/>
+                <a16:creationId xmlns:a16="http://schemas.microsoft.com/office/drawing/2014/main" id="{918D66C8-FF28-4845-9C1A-E11B715588D4}"/>
               </a:ext>
             </a:extLst>
           </p:cNvPr>
@@ -4717,7 +5146,7 @@
         </p:nvSpPr>
         <p:spPr>
           <a:xfrm>
-            <a:off x="4879835" y="2751791"/>
+            <a:off x="4894377" y="3036356"/>
             <a:ext cx="236048" cy="173380"/>
           </a:xfrm>
           <a:prstGeom prst="flowChartDecision">
@@ -4758,28 +5187,537 @@
       </p:sp>
       <p:cxnSp>
         <p:nvCxnSpPr>
-          <p:cNvPr id="72" name="Elbow Connector 78">
+          <p:cNvPr id="98" name="Elbow Connector 63">
             <a:extLst>
               <a:ext uri="{FF2B5EF4-FFF2-40B4-BE49-F238E27FC236}">
-                <a16:creationId xmlns:a16="http://schemas.microsoft.com/office/drawing/2014/main" id="{D5DFB8C5-B0B0-46C1-967B-4449112ABD6F}"/>
+                <a16:creationId xmlns:a16="http://schemas.microsoft.com/office/drawing/2014/main" id="{D544ED50-0859-4364-9287-92443D3B3ADA}"/>
               </a:ext>
             </a:extLst>
           </p:cNvPr>
           <p:cNvCxnSpPr>
             <a:cxnSpLocks/>
-            <a:stCxn id="55" idx="3"/>
-            <a:endCxn id="67" idx="2"/>
           </p:cNvCxnSpPr>
           <p:nvPr/>
         </p:nvCxnSpPr>
         <p:spPr>
-          <a:xfrm rot="16200000" flipV="1">
-            <a:off x="5526404" y="3009488"/>
-            <a:ext cx="227001" cy="217"/>
+          <a:xfrm>
+            <a:off x="5138075" y="3129434"/>
+            <a:ext cx="214777" cy="197"/>
+          </a:xfrm>
+          <a:prstGeom prst="bentConnector3">
+            <a:avLst/>
+          </a:prstGeom>
+          <a:ln w="19050">
+            <a:solidFill>
+              <a:srgbClr val="7030A0"/>
+            </a:solidFill>
+            <a:headEnd type="none" w="med" len="med"/>
+            <a:tailEnd type="arrow" w="med" len="med"/>
+          </a:ln>
+          <a:effectLst/>
+        </p:spPr>
+        <p:style>
+          <a:lnRef idx="1">
+            <a:schemeClr val="accent2"/>
+          </a:lnRef>
+          <a:fillRef idx="2">
+            <a:schemeClr val="accent2"/>
+          </a:fillRef>
+          <a:effectRef idx="1">
+            <a:schemeClr val="accent2"/>
+          </a:effectRef>
+          <a:fontRef idx="minor">
+            <a:schemeClr val="dk1"/>
+          </a:fontRef>
+        </p:style>
+      </p:cxnSp>
+      <p:sp>
+        <p:nvSpPr>
+          <p:cNvPr id="99" name="Rectangle 8">
+            <a:extLst>
+              <a:ext uri="{FF2B5EF4-FFF2-40B4-BE49-F238E27FC236}">
+                <a16:creationId xmlns:a16="http://schemas.microsoft.com/office/drawing/2014/main" id="{0B5BEE9B-ECAB-434A-B516-067DFBD33E34}"/>
+              </a:ext>
+            </a:extLst>
+          </p:cNvPr>
+          <p:cNvSpPr/>
+          <p:nvPr/>
+        </p:nvSpPr>
+        <p:spPr>
+          <a:xfrm>
+            <a:off x="5345202" y="3469904"/>
+            <a:ext cx="708186" cy="285783"/>
+          </a:xfrm>
+          <a:prstGeom prst="rect">
+            <a:avLst/>
+          </a:prstGeom>
+          <a:ln w="19050">
+            <a:solidFill>
+              <a:srgbClr val="7030A0"/>
+            </a:solidFill>
+          </a:ln>
+          <a:effectLst/>
+        </p:spPr>
+        <p:style>
+          <a:lnRef idx="1">
+            <a:schemeClr val="accent4"/>
+          </a:lnRef>
+          <a:fillRef idx="2">
+            <a:schemeClr val="accent4"/>
+          </a:fillRef>
+          <a:effectRef idx="1">
+            <a:schemeClr val="accent4"/>
+          </a:effectRef>
+          <a:fontRef idx="minor">
+            <a:schemeClr val="dk1"/>
+          </a:fontRef>
+        </p:style>
+        <p:txBody>
+          <a:bodyPr rtlCol="0" anchor="ctr"/>
+          <a:lstStyle/>
+          <a:p>
+            <a:pPr algn="ctr"/>
+            <a:r>
+              <a:rPr lang="en-US" sz="1050" dirty="0">
+                <a:solidFill>
+                  <a:srgbClr val="7030A0"/>
+                </a:solidFill>
+              </a:rPr>
+              <a:t>Budget</a:t>
+            </a:r>
+            <a:endParaRPr lang="en-SG" sz="1050" dirty="0">
+              <a:solidFill>
+                <a:srgbClr val="7030A0"/>
+              </a:solidFill>
+            </a:endParaRPr>
+          </a:p>
+        </p:txBody>
+      </p:sp>
+      <p:sp>
+        <p:nvSpPr>
+          <p:cNvPr id="100" name="TextBox 99">
+            <a:extLst>
+              <a:ext uri="{FF2B5EF4-FFF2-40B4-BE49-F238E27FC236}">
+                <a16:creationId xmlns:a16="http://schemas.microsoft.com/office/drawing/2014/main" id="{934977ED-0C1E-491E-AA7A-1218D7D526D3}"/>
+              </a:ext>
+            </a:extLst>
+          </p:cNvPr>
+          <p:cNvSpPr txBox="1"/>
+          <p:nvPr/>
+        </p:nvSpPr>
+        <p:spPr>
+          <a:xfrm>
+            <a:off x="5183402" y="3450423"/>
+            <a:ext cx="189257" cy="178683"/>
+          </a:xfrm>
+          <a:prstGeom prst="rect">
+            <a:avLst/>
+          </a:prstGeom>
+          <a:noFill/>
+        </p:spPr>
+        <p:txBody>
+          <a:bodyPr wrap="square" lIns="0" tIns="0" rIns="0" bIns="0" rtlCol="0">
+            <a:noAutofit/>
+          </a:bodyPr>
+          <a:lstStyle/>
+          <a:p>
+            <a:pPr algn="ctr"/>
+            <a:r>
+              <a:rPr lang="en-US" sz="1100" dirty="0">
+                <a:solidFill>
+                  <a:srgbClr val="7030A0"/>
+                </a:solidFill>
+              </a:rPr>
+              <a:t>*</a:t>
+            </a:r>
+            <a:endParaRPr lang="en-SG" sz="1100" dirty="0">
+              <a:solidFill>
+                <a:srgbClr val="7030A0"/>
+              </a:solidFill>
+            </a:endParaRPr>
+          </a:p>
+        </p:txBody>
+      </p:sp>
+      <p:sp>
+        <p:nvSpPr>
+          <p:cNvPr id="101" name="Flowchart: Decision 100">
+            <a:extLst>
+              <a:ext uri="{FF2B5EF4-FFF2-40B4-BE49-F238E27FC236}">
+                <a16:creationId xmlns:a16="http://schemas.microsoft.com/office/drawing/2014/main" id="{BE0A94F8-3769-4E0E-BB58-9AF132184A34}"/>
+              </a:ext>
+            </a:extLst>
+          </p:cNvPr>
+          <p:cNvSpPr/>
+          <p:nvPr/>
+        </p:nvSpPr>
+        <p:spPr>
+          <a:xfrm>
+            <a:off x="4894377" y="3525909"/>
+            <a:ext cx="236048" cy="173380"/>
+          </a:xfrm>
+          <a:prstGeom prst="flowChartDecision">
+            <a:avLst/>
+          </a:prstGeom>
+          <a:solidFill>
+            <a:srgbClr val="7030A0"/>
+          </a:solidFill>
+          <a:ln w="19050">
+            <a:solidFill>
+              <a:srgbClr val="7030A0"/>
+            </a:solidFill>
+          </a:ln>
+          <a:effectLst/>
+        </p:spPr>
+        <p:style>
+          <a:lnRef idx="1">
+            <a:schemeClr val="accent6"/>
+          </a:lnRef>
+          <a:fillRef idx="2">
+            <a:schemeClr val="accent6"/>
+          </a:fillRef>
+          <a:effectRef idx="1">
+            <a:schemeClr val="accent6"/>
+          </a:effectRef>
+          <a:fontRef idx="minor">
+            <a:schemeClr val="dk1"/>
+          </a:fontRef>
+        </p:style>
+        <p:txBody>
+          <a:bodyPr rtlCol="0" anchor="ctr"/>
+          <a:lstStyle/>
+          <a:p>
+            <a:pPr algn="ctr"/>
+            <a:endParaRPr lang="en-US" sz="1050"/>
+          </a:p>
+        </p:txBody>
+      </p:sp>
+      <p:cxnSp>
+        <p:nvCxnSpPr>
+          <p:cNvPr id="102" name="Elbow Connector 63">
+            <a:extLst>
+              <a:ext uri="{FF2B5EF4-FFF2-40B4-BE49-F238E27FC236}">
+                <a16:creationId xmlns:a16="http://schemas.microsoft.com/office/drawing/2014/main" id="{1ED141B7-2854-4157-8C8A-311A4EDA73F3}"/>
+              </a:ext>
+            </a:extLst>
+          </p:cNvPr>
+          <p:cNvCxnSpPr>
+            <a:cxnSpLocks/>
+          </p:cNvCxnSpPr>
+          <p:nvPr/>
+        </p:nvCxnSpPr>
+        <p:spPr>
+          <a:xfrm>
+            <a:off x="5138075" y="3618987"/>
+            <a:ext cx="214777" cy="197"/>
+          </a:xfrm>
+          <a:prstGeom prst="bentConnector3">
+            <a:avLst/>
+          </a:prstGeom>
+          <a:ln w="19050">
+            <a:solidFill>
+              <a:srgbClr val="7030A0"/>
+            </a:solidFill>
+            <a:headEnd type="none" w="med" len="med"/>
+            <a:tailEnd type="arrow" w="med" len="med"/>
+          </a:ln>
+          <a:effectLst/>
+        </p:spPr>
+        <p:style>
+          <a:lnRef idx="1">
+            <a:schemeClr val="accent2"/>
+          </a:lnRef>
+          <a:fillRef idx="2">
+            <a:schemeClr val="accent2"/>
+          </a:fillRef>
+          <a:effectRef idx="1">
+            <a:schemeClr val="accent2"/>
+          </a:effectRef>
+          <a:fontRef idx="minor">
+            <a:schemeClr val="dk1"/>
+          </a:fontRef>
+        </p:style>
+      </p:cxnSp>
+      <p:sp>
+        <p:nvSpPr>
+          <p:cNvPr id="108" name="Flowchart: Decision 96">
+            <a:extLst>
+              <a:ext uri="{FF2B5EF4-FFF2-40B4-BE49-F238E27FC236}">
+                <a16:creationId xmlns:a16="http://schemas.microsoft.com/office/drawing/2014/main" id="{1A253588-7D3D-46EF-8701-F15B5BD00F9C}"/>
+              </a:ext>
+            </a:extLst>
+          </p:cNvPr>
+          <p:cNvSpPr/>
+          <p:nvPr/>
+        </p:nvSpPr>
+        <p:spPr>
+          <a:xfrm>
+            <a:off x="6064122" y="2517395"/>
+            <a:ext cx="236048" cy="173380"/>
+          </a:xfrm>
+          <a:prstGeom prst="flowChartDecision">
+            <a:avLst/>
+          </a:prstGeom>
+          <a:solidFill>
+            <a:srgbClr val="7030A0"/>
+          </a:solidFill>
+          <a:ln w="19050">
+            <a:solidFill>
+              <a:srgbClr val="7030A0"/>
+            </a:solidFill>
+          </a:ln>
+          <a:effectLst/>
+        </p:spPr>
+        <p:style>
+          <a:lnRef idx="1">
+            <a:schemeClr val="accent6"/>
+          </a:lnRef>
+          <a:fillRef idx="2">
+            <a:schemeClr val="accent6"/>
+          </a:fillRef>
+          <a:effectRef idx="1">
+            <a:schemeClr val="accent6"/>
+          </a:effectRef>
+          <a:fontRef idx="minor">
+            <a:schemeClr val="dk1"/>
+          </a:fontRef>
+        </p:style>
+        <p:txBody>
+          <a:bodyPr rtlCol="0" anchor="ctr"/>
+          <a:lstStyle/>
+          <a:p>
+            <a:pPr algn="ctr"/>
+            <a:endParaRPr lang="en-US" sz="1050"/>
+          </a:p>
+        </p:txBody>
+      </p:sp>
+      <p:sp>
+        <p:nvSpPr>
+          <p:cNvPr id="109" name="Flowchart: Decision 96">
+            <a:extLst>
+              <a:ext uri="{FF2B5EF4-FFF2-40B4-BE49-F238E27FC236}">
+                <a16:creationId xmlns:a16="http://schemas.microsoft.com/office/drawing/2014/main" id="{94D1BB24-2FF9-4B1C-B487-EFD205488FA8}"/>
+              </a:ext>
+            </a:extLst>
+          </p:cNvPr>
+          <p:cNvSpPr/>
+          <p:nvPr/>
+        </p:nvSpPr>
+        <p:spPr>
+          <a:xfrm>
+            <a:off x="6067135" y="3036356"/>
+            <a:ext cx="236048" cy="173380"/>
+          </a:xfrm>
+          <a:prstGeom prst="flowChartDecision">
+            <a:avLst/>
+          </a:prstGeom>
+          <a:solidFill>
+            <a:srgbClr val="7030A0"/>
+          </a:solidFill>
+          <a:ln w="19050">
+            <a:solidFill>
+              <a:srgbClr val="7030A0"/>
+            </a:solidFill>
+          </a:ln>
+          <a:effectLst/>
+        </p:spPr>
+        <p:style>
+          <a:lnRef idx="1">
+            <a:schemeClr val="accent6"/>
+          </a:lnRef>
+          <a:fillRef idx="2">
+            <a:schemeClr val="accent6"/>
+          </a:fillRef>
+          <a:effectRef idx="1">
+            <a:schemeClr val="accent6"/>
+          </a:effectRef>
+          <a:fontRef idx="minor">
+            <a:schemeClr val="dk1"/>
+          </a:fontRef>
+        </p:style>
+        <p:txBody>
+          <a:bodyPr rtlCol="0" anchor="ctr"/>
+          <a:lstStyle/>
+          <a:p>
+            <a:pPr algn="ctr"/>
+            <a:endParaRPr lang="en-US" sz="1050"/>
+          </a:p>
+        </p:txBody>
+      </p:sp>
+      <p:sp>
+        <p:nvSpPr>
+          <p:cNvPr id="110" name="Flowchart: Decision 96">
+            <a:extLst>
+              <a:ext uri="{FF2B5EF4-FFF2-40B4-BE49-F238E27FC236}">
+                <a16:creationId xmlns:a16="http://schemas.microsoft.com/office/drawing/2014/main" id="{6B3600C7-E787-4D90-931C-D02DC1C35B22}"/>
+              </a:ext>
+            </a:extLst>
+          </p:cNvPr>
+          <p:cNvSpPr/>
+          <p:nvPr/>
+        </p:nvSpPr>
+        <p:spPr>
+          <a:xfrm>
+            <a:off x="6064122" y="3518277"/>
+            <a:ext cx="236048" cy="173380"/>
+          </a:xfrm>
+          <a:prstGeom prst="flowChartDecision">
+            <a:avLst/>
+          </a:prstGeom>
+          <a:solidFill>
+            <a:srgbClr val="7030A0"/>
+          </a:solidFill>
+          <a:ln w="19050">
+            <a:solidFill>
+              <a:srgbClr val="7030A0"/>
+            </a:solidFill>
+          </a:ln>
+          <a:effectLst/>
+        </p:spPr>
+        <p:style>
+          <a:lnRef idx="1">
+            <a:schemeClr val="accent6"/>
+          </a:lnRef>
+          <a:fillRef idx="2">
+            <a:schemeClr val="accent6"/>
+          </a:fillRef>
+          <a:effectRef idx="1">
+            <a:schemeClr val="accent6"/>
+          </a:effectRef>
+          <a:fontRef idx="minor">
+            <a:schemeClr val="dk1"/>
+          </a:fontRef>
+        </p:style>
+        <p:txBody>
+          <a:bodyPr rtlCol="0" anchor="ctr"/>
+          <a:lstStyle/>
+          <a:p>
+            <a:pPr algn="ctr"/>
+            <a:endParaRPr lang="en-US" sz="1050"/>
+          </a:p>
+        </p:txBody>
+      </p:sp>
+      <p:cxnSp>
+        <p:nvCxnSpPr>
+          <p:cNvPr id="111" name="Elbow Connector 85">
+            <a:extLst>
+              <a:ext uri="{FF2B5EF4-FFF2-40B4-BE49-F238E27FC236}">
+                <a16:creationId xmlns:a16="http://schemas.microsoft.com/office/drawing/2014/main" id="{2AC5A707-0BC3-4A0C-8A81-C857C500CFA3}"/>
+              </a:ext>
+            </a:extLst>
+          </p:cNvPr>
+          <p:cNvCxnSpPr>
+            <a:cxnSpLocks/>
+            <a:stCxn id="108" idx="3"/>
+            <a:endCxn id="80" idx="1"/>
+          </p:cNvCxnSpPr>
+          <p:nvPr/>
+        </p:nvCxnSpPr>
+        <p:spPr>
+          <a:xfrm flipV="1">
+            <a:off x="6300170" y="2599470"/>
+            <a:ext cx="543862" cy="4615"/>
+          </a:xfrm>
+          <a:prstGeom prst="bentConnector3">
+            <a:avLst/>
+          </a:prstGeom>
+          <a:ln w="19050">
+            <a:solidFill>
+              <a:srgbClr val="7030A0"/>
+            </a:solidFill>
+            <a:headEnd type="none" w="med" len="med"/>
+            <a:tailEnd type="arrow" w="med" len="med"/>
+          </a:ln>
+          <a:effectLst/>
+        </p:spPr>
+        <p:style>
+          <a:lnRef idx="1">
+            <a:schemeClr val="accent2"/>
+          </a:lnRef>
+          <a:fillRef idx="2">
+            <a:schemeClr val="accent2"/>
+          </a:fillRef>
+          <a:effectRef idx="1">
+            <a:schemeClr val="accent2"/>
+          </a:effectRef>
+          <a:fontRef idx="minor">
+            <a:schemeClr val="dk1"/>
+          </a:fontRef>
+        </p:style>
+      </p:cxnSp>
+      <p:cxnSp>
+        <p:nvCxnSpPr>
+          <p:cNvPr id="116" name="Elbow Connector 85">
+            <a:extLst>
+              <a:ext uri="{FF2B5EF4-FFF2-40B4-BE49-F238E27FC236}">
+                <a16:creationId xmlns:a16="http://schemas.microsoft.com/office/drawing/2014/main" id="{33A07729-D340-4612-A62D-B44896A7DE31}"/>
+              </a:ext>
+            </a:extLst>
+          </p:cNvPr>
+          <p:cNvCxnSpPr>
+            <a:cxnSpLocks/>
+            <a:stCxn id="109" idx="3"/>
+            <a:endCxn id="83" idx="1"/>
+          </p:cNvCxnSpPr>
+          <p:nvPr/>
+        </p:nvCxnSpPr>
+        <p:spPr>
+          <a:xfrm flipV="1">
+            <a:off x="6303183" y="2922448"/>
+            <a:ext cx="540849" cy="200598"/>
           </a:xfrm>
           <a:prstGeom prst="bentConnector3">
             <a:avLst>
-              <a:gd name="adj1" fmla="val 50000"/>
+              <a:gd name="adj1" fmla="val 47182"/>
+            </a:avLst>
+          </a:prstGeom>
+          <a:ln w="19050">
+            <a:solidFill>
+              <a:srgbClr val="7030A0"/>
+            </a:solidFill>
+            <a:headEnd type="none" w="med" len="med"/>
+            <a:tailEnd type="arrow" w="med" len="med"/>
+          </a:ln>
+          <a:effectLst/>
+        </p:spPr>
+        <p:style>
+          <a:lnRef idx="1">
+            <a:schemeClr val="accent2"/>
+          </a:lnRef>
+          <a:fillRef idx="2">
+            <a:schemeClr val="accent2"/>
+          </a:fillRef>
+          <a:effectRef idx="1">
+            <a:schemeClr val="accent2"/>
+          </a:effectRef>
+          <a:fontRef idx="minor">
+            <a:schemeClr val="dk1"/>
+          </a:fontRef>
+        </p:style>
+      </p:cxnSp>
+      <p:cxnSp>
+        <p:nvCxnSpPr>
+          <p:cNvPr id="119" name="Elbow Connector 85">
+            <a:extLst>
+              <a:ext uri="{FF2B5EF4-FFF2-40B4-BE49-F238E27FC236}">
+                <a16:creationId xmlns:a16="http://schemas.microsoft.com/office/drawing/2014/main" id="{AAF2C7B8-7327-413F-8EB6-A8DBF3B114C1}"/>
+              </a:ext>
+            </a:extLst>
+          </p:cNvPr>
+          <p:cNvCxnSpPr>
+            <a:cxnSpLocks/>
+            <a:stCxn id="110" idx="3"/>
+            <a:endCxn id="85" idx="1"/>
+          </p:cNvCxnSpPr>
+          <p:nvPr/>
+        </p:nvCxnSpPr>
+        <p:spPr>
+          <a:xfrm flipV="1">
+            <a:off x="6300170" y="3336514"/>
+            <a:ext cx="543861" cy="268453"/>
+          </a:xfrm>
+          <a:prstGeom prst="bentConnector3">
+            <a:avLst>
+              <a:gd name="adj1" fmla="val 48132"/>
             </a:avLst>
           </a:prstGeom>
           <a:ln w="19050">

</xml_diff>